<commit_message>
update pptx with today's date and version
</commit_message>
<xml_diff>
--- a/Cookie Dough v0 draft.pptx
+++ b/Cookie Dough v0 draft.pptx
@@ -219,7 +219,7 @@
           <a:p>
             <a:fld id="{71A1B7DA-BCCD-42B4-8C71-92EE245E53F2}" type="datetimeFigureOut">
               <a:rPr lang="en-US" smtClean="0"/>
-              <a:t>9/11/2015</a:t>
+              <a:t>9/24/15</a:t>
             </a:fld>
             <a:endParaRPr lang="en-US"/>
           </a:p>
@@ -702,7 +702,7 @@
           <a:p>
             <a:fld id="{BE7E790E-49B1-4F83-B1A8-60D4C12FC081}" type="datetimeFigureOut">
               <a:rPr lang="en-US" smtClean="0"/>
-              <a:t>9/11/2015</a:t>
+              <a:t>9/24/15</a:t>
             </a:fld>
             <a:endParaRPr lang="en-US"/>
           </a:p>
@@ -872,7 +872,7 @@
           <a:p>
             <a:fld id="{BE7E790E-49B1-4F83-B1A8-60D4C12FC081}" type="datetimeFigureOut">
               <a:rPr lang="en-US" smtClean="0"/>
-              <a:t>9/11/2015</a:t>
+              <a:t>9/24/15</a:t>
             </a:fld>
             <a:endParaRPr lang="en-US"/>
           </a:p>
@@ -1052,7 +1052,7 @@
           <a:p>
             <a:fld id="{BE7E790E-49B1-4F83-B1A8-60D4C12FC081}" type="datetimeFigureOut">
               <a:rPr lang="en-US" smtClean="0"/>
-              <a:t>9/11/2015</a:t>
+              <a:t>9/24/15</a:t>
             </a:fld>
             <a:endParaRPr lang="en-US"/>
           </a:p>
@@ -1222,7 +1222,7 @@
           <a:p>
             <a:fld id="{BE7E790E-49B1-4F83-B1A8-60D4C12FC081}" type="datetimeFigureOut">
               <a:rPr lang="en-US" smtClean="0"/>
-              <a:t>9/11/2015</a:t>
+              <a:t>9/24/15</a:t>
             </a:fld>
             <a:endParaRPr lang="en-US"/>
           </a:p>
@@ -1468,7 +1468,7 @@
           <a:p>
             <a:fld id="{BE7E790E-49B1-4F83-B1A8-60D4C12FC081}" type="datetimeFigureOut">
               <a:rPr lang="en-US" smtClean="0"/>
-              <a:t>9/11/2015</a:t>
+              <a:t>9/24/15</a:t>
             </a:fld>
             <a:endParaRPr lang="en-US"/>
           </a:p>
@@ -1700,7 +1700,7 @@
           <a:p>
             <a:fld id="{BE7E790E-49B1-4F83-B1A8-60D4C12FC081}" type="datetimeFigureOut">
               <a:rPr lang="en-US" smtClean="0"/>
-              <a:t>9/11/2015</a:t>
+              <a:t>9/24/15</a:t>
             </a:fld>
             <a:endParaRPr lang="en-US"/>
           </a:p>
@@ -2067,7 +2067,7 @@
           <a:p>
             <a:fld id="{BE7E790E-49B1-4F83-B1A8-60D4C12FC081}" type="datetimeFigureOut">
               <a:rPr lang="en-US" smtClean="0"/>
-              <a:t>9/11/2015</a:t>
+              <a:t>9/24/15</a:t>
             </a:fld>
             <a:endParaRPr lang="en-US"/>
           </a:p>
@@ -2185,7 +2185,7 @@
           <a:p>
             <a:fld id="{BE7E790E-49B1-4F83-B1A8-60D4C12FC081}" type="datetimeFigureOut">
               <a:rPr lang="en-US" smtClean="0"/>
-              <a:t>9/11/2015</a:t>
+              <a:t>9/24/15</a:t>
             </a:fld>
             <a:endParaRPr lang="en-US"/>
           </a:p>
@@ -2280,7 +2280,7 @@
           <a:p>
             <a:fld id="{BE7E790E-49B1-4F83-B1A8-60D4C12FC081}" type="datetimeFigureOut">
               <a:rPr lang="en-US" smtClean="0"/>
-              <a:t>9/11/2015</a:t>
+              <a:t>9/24/15</a:t>
             </a:fld>
             <a:endParaRPr lang="en-US"/>
           </a:p>
@@ -2557,7 +2557,7 @@
           <a:p>
             <a:fld id="{BE7E790E-49B1-4F83-B1A8-60D4C12FC081}" type="datetimeFigureOut">
               <a:rPr lang="en-US" smtClean="0"/>
-              <a:t>9/11/2015</a:t>
+              <a:t>9/24/15</a:t>
             </a:fld>
             <a:endParaRPr lang="en-US"/>
           </a:p>
@@ -2810,7 +2810,7 @@
           <a:p>
             <a:fld id="{BE7E790E-49B1-4F83-B1A8-60D4C12FC081}" type="datetimeFigureOut">
               <a:rPr lang="en-US" smtClean="0"/>
-              <a:t>9/11/2015</a:t>
+              <a:t>9/24/15</a:t>
             </a:fld>
             <a:endParaRPr lang="en-US"/>
           </a:p>
@@ -3023,7 +3023,7 @@
           <a:p>
             <a:fld id="{BE7E790E-49B1-4F83-B1A8-60D4C12FC081}" type="datetimeFigureOut">
               <a:rPr lang="en-US" smtClean="0"/>
-              <a:t>9/11/2015</a:t>
+              <a:t>9/24/15</a:t>
             </a:fld>
             <a:endParaRPr lang="en-US"/>
           </a:p>
@@ -3468,6 +3468,16 @@
           </a:bodyPr>
           <a:lstStyle/>
           <a:p>
+            <a:r>
+              <a:rPr lang="en-US" dirty="0" smtClean="0"/>
+              <a:t>V0</a:t>
+            </a:r>
+          </a:p>
+          <a:p>
+            <a:r>
+              <a:rPr lang="en-US" smtClean="0"/>
+              <a:t>9-24-2015</a:t>
+            </a:r>
             <a:endParaRPr lang="en-US" dirty="0"/>
           </a:p>
         </p:txBody>

</xml_diff>